<commit_message>
pdf jupiter, ppt updated
</commit_message>
<xml_diff>
--- a/Presentación.pptx
+++ b/Presentación.pptx
@@ -107,6 +107,11 @@
       </a:defRPr>
     </a:lvl9pPr>
   </p:defaultTextStyle>
+  <p:extLst>
+    <p:ext uri="{EFAFB233-063F-42B5-8137-9DF3F51BA10A}">
+      <p15:sldGuideLst xmlns:p15="http://schemas.microsoft.com/office/powerpoint/2012/main"/>
+    </p:ext>
+  </p:extLst>
 </p:presentation>
 </file>
 
@@ -259,7 +264,7 @@
           <a:p>
             <a:fld id="{6D78EC0B-D654-4DCA-B28D-2D9FBD433799}" type="datetimeFigureOut">
               <a:rPr lang="es-AR" smtClean="0"/>
-              <a:t>27/11/2023</a:t>
+              <a:t>28/11/2023</a:t>
             </a:fld>
             <a:endParaRPr lang="es-AR"/>
           </a:p>
@@ -313,7 +318,7 @@
           <a:p>
             <a:fld id="{7BA853B7-2E9E-44AB-B1FF-C81D527EB835}" type="slidenum">
               <a:rPr lang="es-AR" smtClean="0"/>
-              <a:t>‹Nº›</a:t>
+              <a:t>‹#›</a:t>
             </a:fld>
             <a:endParaRPr lang="es-AR"/>
           </a:p>
@@ -459,7 +464,7 @@
           <a:p>
             <a:fld id="{6D78EC0B-D654-4DCA-B28D-2D9FBD433799}" type="datetimeFigureOut">
               <a:rPr lang="es-AR" smtClean="0"/>
-              <a:t>27/11/2023</a:t>
+              <a:t>28/11/2023</a:t>
             </a:fld>
             <a:endParaRPr lang="es-AR"/>
           </a:p>
@@ -513,7 +518,7 @@
           <a:p>
             <a:fld id="{7BA853B7-2E9E-44AB-B1FF-C81D527EB835}" type="slidenum">
               <a:rPr lang="es-AR" smtClean="0"/>
-              <a:t>‹Nº›</a:t>
+              <a:t>‹#›</a:t>
             </a:fld>
             <a:endParaRPr lang="es-AR"/>
           </a:p>
@@ -669,7 +674,7 @@
           <a:p>
             <a:fld id="{6D78EC0B-D654-4DCA-B28D-2D9FBD433799}" type="datetimeFigureOut">
               <a:rPr lang="es-AR" smtClean="0"/>
-              <a:t>27/11/2023</a:t>
+              <a:t>28/11/2023</a:t>
             </a:fld>
             <a:endParaRPr lang="es-AR"/>
           </a:p>
@@ -723,7 +728,7 @@
           <a:p>
             <a:fld id="{7BA853B7-2E9E-44AB-B1FF-C81D527EB835}" type="slidenum">
               <a:rPr lang="es-AR" smtClean="0"/>
-              <a:t>‹Nº›</a:t>
+              <a:t>‹#›</a:t>
             </a:fld>
             <a:endParaRPr lang="es-AR"/>
           </a:p>
@@ -869,7 +874,7 @@
           <a:p>
             <a:fld id="{6D78EC0B-D654-4DCA-B28D-2D9FBD433799}" type="datetimeFigureOut">
               <a:rPr lang="es-AR" smtClean="0"/>
-              <a:t>27/11/2023</a:t>
+              <a:t>28/11/2023</a:t>
             </a:fld>
             <a:endParaRPr lang="es-AR"/>
           </a:p>
@@ -923,7 +928,7 @@
           <a:p>
             <a:fld id="{7BA853B7-2E9E-44AB-B1FF-C81D527EB835}" type="slidenum">
               <a:rPr lang="es-AR" smtClean="0"/>
-              <a:t>‹Nº›</a:t>
+              <a:t>‹#›</a:t>
             </a:fld>
             <a:endParaRPr lang="es-AR"/>
           </a:p>
@@ -1145,7 +1150,7 @@
           <a:p>
             <a:fld id="{6D78EC0B-D654-4DCA-B28D-2D9FBD433799}" type="datetimeFigureOut">
               <a:rPr lang="es-AR" smtClean="0"/>
-              <a:t>27/11/2023</a:t>
+              <a:t>28/11/2023</a:t>
             </a:fld>
             <a:endParaRPr lang="es-AR"/>
           </a:p>
@@ -1199,7 +1204,7 @@
           <a:p>
             <a:fld id="{7BA853B7-2E9E-44AB-B1FF-C81D527EB835}" type="slidenum">
               <a:rPr lang="es-AR" smtClean="0"/>
-              <a:t>‹Nº›</a:t>
+              <a:t>‹#›</a:t>
             </a:fld>
             <a:endParaRPr lang="es-AR"/>
           </a:p>
@@ -1413,7 +1418,7 @@
           <a:p>
             <a:fld id="{6D78EC0B-D654-4DCA-B28D-2D9FBD433799}" type="datetimeFigureOut">
               <a:rPr lang="es-AR" smtClean="0"/>
-              <a:t>27/11/2023</a:t>
+              <a:t>28/11/2023</a:t>
             </a:fld>
             <a:endParaRPr lang="es-AR"/>
           </a:p>
@@ -1467,7 +1472,7 @@
           <a:p>
             <a:fld id="{7BA853B7-2E9E-44AB-B1FF-C81D527EB835}" type="slidenum">
               <a:rPr lang="es-AR" smtClean="0"/>
-              <a:t>‹Nº›</a:t>
+              <a:t>‹#›</a:t>
             </a:fld>
             <a:endParaRPr lang="es-AR"/>
           </a:p>
@@ -1828,7 +1833,7 @@
           <a:p>
             <a:fld id="{6D78EC0B-D654-4DCA-B28D-2D9FBD433799}" type="datetimeFigureOut">
               <a:rPr lang="es-AR" smtClean="0"/>
-              <a:t>27/11/2023</a:t>
+              <a:t>28/11/2023</a:t>
             </a:fld>
             <a:endParaRPr lang="es-AR"/>
           </a:p>
@@ -1882,7 +1887,7 @@
           <a:p>
             <a:fld id="{7BA853B7-2E9E-44AB-B1FF-C81D527EB835}" type="slidenum">
               <a:rPr lang="es-AR" smtClean="0"/>
-              <a:t>‹Nº›</a:t>
+              <a:t>‹#›</a:t>
             </a:fld>
             <a:endParaRPr lang="es-AR"/>
           </a:p>
@@ -1970,7 +1975,7 @@
           <a:p>
             <a:fld id="{6D78EC0B-D654-4DCA-B28D-2D9FBD433799}" type="datetimeFigureOut">
               <a:rPr lang="es-AR" smtClean="0"/>
-              <a:t>27/11/2023</a:t>
+              <a:t>28/11/2023</a:t>
             </a:fld>
             <a:endParaRPr lang="es-AR"/>
           </a:p>
@@ -2024,7 +2029,7 @@
           <a:p>
             <a:fld id="{7BA853B7-2E9E-44AB-B1FF-C81D527EB835}" type="slidenum">
               <a:rPr lang="es-AR" smtClean="0"/>
-              <a:t>‹Nº›</a:t>
+              <a:t>‹#›</a:t>
             </a:fld>
             <a:endParaRPr lang="es-AR"/>
           </a:p>
@@ -2083,7 +2088,7 @@
           <a:p>
             <a:fld id="{6D78EC0B-D654-4DCA-B28D-2D9FBD433799}" type="datetimeFigureOut">
               <a:rPr lang="es-AR" smtClean="0"/>
-              <a:t>27/11/2023</a:t>
+              <a:t>28/11/2023</a:t>
             </a:fld>
             <a:endParaRPr lang="es-AR"/>
           </a:p>
@@ -2137,7 +2142,7 @@
           <a:p>
             <a:fld id="{7BA853B7-2E9E-44AB-B1FF-C81D527EB835}" type="slidenum">
               <a:rPr lang="es-AR" smtClean="0"/>
-              <a:t>‹Nº›</a:t>
+              <a:t>‹#›</a:t>
             </a:fld>
             <a:endParaRPr lang="es-AR"/>
           </a:p>
@@ -2396,7 +2401,7 @@
           <a:p>
             <a:fld id="{6D78EC0B-D654-4DCA-B28D-2D9FBD433799}" type="datetimeFigureOut">
               <a:rPr lang="es-AR" smtClean="0"/>
-              <a:t>27/11/2023</a:t>
+              <a:t>28/11/2023</a:t>
             </a:fld>
             <a:endParaRPr lang="es-AR"/>
           </a:p>
@@ -2450,7 +2455,7 @@
           <a:p>
             <a:fld id="{7BA853B7-2E9E-44AB-B1FF-C81D527EB835}" type="slidenum">
               <a:rPr lang="es-AR" smtClean="0"/>
-              <a:t>‹Nº›</a:t>
+              <a:t>‹#›</a:t>
             </a:fld>
             <a:endParaRPr lang="es-AR"/>
           </a:p>
@@ -2685,7 +2690,7 @@
           <a:p>
             <a:fld id="{6D78EC0B-D654-4DCA-B28D-2D9FBD433799}" type="datetimeFigureOut">
               <a:rPr lang="es-AR" smtClean="0"/>
-              <a:t>27/11/2023</a:t>
+              <a:t>28/11/2023</a:t>
             </a:fld>
             <a:endParaRPr lang="es-AR"/>
           </a:p>
@@ -2739,7 +2744,7 @@
           <a:p>
             <a:fld id="{7BA853B7-2E9E-44AB-B1FF-C81D527EB835}" type="slidenum">
               <a:rPr lang="es-AR" smtClean="0"/>
-              <a:t>‹Nº›</a:t>
+              <a:t>‹#›</a:t>
             </a:fld>
             <a:endParaRPr lang="es-AR"/>
           </a:p>
@@ -2928,7 +2933,7 @@
           <a:p>
             <a:fld id="{6D78EC0B-D654-4DCA-B28D-2D9FBD433799}" type="datetimeFigureOut">
               <a:rPr lang="es-AR" smtClean="0"/>
-              <a:t>27/11/2023</a:t>
+              <a:t>28/11/2023</a:t>
             </a:fld>
             <a:endParaRPr lang="es-AR"/>
           </a:p>
@@ -3018,7 +3023,7 @@
           <a:p>
             <a:fld id="{7BA853B7-2E9E-44AB-B1FF-C81D527EB835}" type="slidenum">
               <a:rPr lang="es-AR" smtClean="0"/>
-              <a:t>‹Nº›</a:t>
+              <a:t>‹#›</a:t>
             </a:fld>
             <a:endParaRPr lang="es-AR"/>
           </a:p>
@@ -3452,8 +3457,14 @@
           <a:lstStyle/>
           <a:p>
             <a:r>
-              <a:rPr lang="es-ES" dirty="0"/>
-              <a:t>Excelente performance en campaña de marketing en el mes de mayo</a:t>
+              <a:rPr lang="es-ES" b="0" i="0" dirty="0">
+                <a:solidFill>
+                  <a:srgbClr val="374151"/>
+                </a:solidFill>
+                <a:effectLst/>
+                <a:latin typeface="Söhne"/>
+              </a:rPr>
+              <a:t>Éxito destacado en la campaña de marketing de Mayo</a:t>
             </a:r>
             <a:endParaRPr lang="es-AR" dirty="0"/>
           </a:p>
@@ -3968,8 +3979,52 @@
           <a:lstStyle/>
           <a:p>
             <a:r>
-              <a:rPr lang="es-ES" dirty="0"/>
-              <a:t>Tendencias de compras por géneros</a:t>
+              <a:rPr lang="es-ES" b="0" i="0" dirty="0">
+                <a:solidFill>
+                  <a:srgbClr val="374151"/>
+                </a:solidFill>
+                <a:effectLst/>
+                <a:latin typeface="Söhne"/>
+              </a:rPr>
+              <a:t>La Ropa: un </a:t>
+            </a:r>
+            <a:r>
+              <a:rPr lang="es-ES" dirty="0">
+                <a:solidFill>
+                  <a:srgbClr val="374151"/>
+                </a:solidFill>
+                <a:latin typeface="Söhne"/>
+              </a:rPr>
+              <a:t>p</a:t>
+            </a:r>
+            <a:r>
+              <a:rPr lang="es-ES" b="0" i="0" dirty="0">
+                <a:solidFill>
+                  <a:srgbClr val="374151"/>
+                </a:solidFill>
+                <a:effectLst/>
+                <a:latin typeface="Söhne"/>
+              </a:rPr>
+              <a:t>roducto </a:t>
+            </a:r>
+            <a:r>
+              <a:rPr lang="es-ES" dirty="0">
+                <a:solidFill>
+                  <a:srgbClr val="374151"/>
+                </a:solidFill>
+                <a:latin typeface="Söhne"/>
+              </a:rPr>
+              <a:t>v</a:t>
+            </a:r>
+            <a:r>
+              <a:rPr lang="es-ES" b="0" i="0" dirty="0">
+                <a:solidFill>
+                  <a:srgbClr val="374151"/>
+                </a:solidFill>
+                <a:effectLst/>
+                <a:latin typeface="Söhne"/>
+              </a:rPr>
+              <a:t>ersátil para todos los géneros</a:t>
             </a:r>
             <a:endParaRPr lang="es-AR" dirty="0"/>
           </a:p>

</xml_diff>